<commit_message>
Improver PLL - Na-Perm
Introduced Na-Perm for diagonal corner swap during Improver PLL
</commit_message>
<xml_diff>
--- a/improver/Improver Method Pt. 4.pptx
+++ b/improver/Improver Method Pt. 4.pptx
@@ -210,7 +210,7 @@
           <a:p>
             <a:fld id="{81DF5B22-17DE-394A-833F-9DC08AE08763}" type="datetimeFigureOut">
               <a:rPr lang="en-US" smtClean="0"/>
-              <a:t>12/21/16</a:t>
+              <a:t>4/6/17</a:t>
             </a:fld>
             <a:endParaRPr lang="en-US" dirty="0"/>
           </a:p>
@@ -792,7 +792,7 @@
             <a:fld id="{B61BEF0D-F0BB-DE4B-95CE-6DB70DBA9567}" type="datetimeFigureOut">
               <a:rPr lang="en-US"/>
               <a:pPr/>
-              <a:t>12/21/16</a:t>
+              <a:t>4/6/17</a:t>
             </a:fld>
             <a:endParaRPr lang="en-US" dirty="0"/>
           </a:p>
@@ -1123,7 +1123,7 @@
             <a:fld id="{B61BEF0D-F0BB-DE4B-95CE-6DB70DBA9567}" type="datetimeFigureOut">
               <a:rPr lang="en-US"/>
               <a:pPr/>
-              <a:t>12/21/16</a:t>
+              <a:t>4/6/17</a:t>
             </a:fld>
             <a:endParaRPr lang="en-US" dirty="0"/>
           </a:p>
@@ -1398,7 +1398,7 @@
             <a:fld id="{B61BEF0D-F0BB-DE4B-95CE-6DB70DBA9567}" type="datetimeFigureOut">
               <a:rPr lang="en-US"/>
               <a:pPr/>
-              <a:t>12/21/16</a:t>
+              <a:t>4/6/17</a:t>
             </a:fld>
             <a:endParaRPr lang="en-US" dirty="0"/>
           </a:p>
@@ -1963,7 +1963,7 @@
             <a:fld id="{B61BEF0D-F0BB-DE4B-95CE-6DB70DBA9567}" type="datetimeFigureOut">
               <a:rPr lang="en-US"/>
               <a:pPr/>
-              <a:t>12/21/16</a:t>
+              <a:t>4/6/17</a:t>
             </a:fld>
             <a:endParaRPr lang="en-US" dirty="0"/>
           </a:p>
@@ -2238,7 +2238,7 @@
             <a:fld id="{B61BEF0D-F0BB-DE4B-95CE-6DB70DBA9567}" type="datetimeFigureOut">
               <a:rPr lang="en-US"/>
               <a:pPr/>
-              <a:t>12/21/16</a:t>
+              <a:t>4/6/17</a:t>
             </a:fld>
             <a:endParaRPr lang="en-US" dirty="0"/>
           </a:p>
@@ -2797,7 +2797,7 @@
             <a:fld id="{B61BEF0D-F0BB-DE4B-95CE-6DB70DBA9567}" type="datetimeFigureOut">
               <a:rPr lang="en-US"/>
               <a:pPr/>
-              <a:t>12/21/16</a:t>
+              <a:t>4/6/17</a:t>
             </a:fld>
             <a:endParaRPr lang="en-US" dirty="0"/>
           </a:p>
@@ -3121,7 +3121,7 @@
             <a:fld id="{B61BEF0D-F0BB-DE4B-95CE-6DB70DBA9567}" type="datetimeFigureOut">
               <a:rPr lang="en-US"/>
               <a:pPr/>
-              <a:t>12/21/16</a:t>
+              <a:t>4/6/17</a:t>
             </a:fld>
             <a:endParaRPr lang="en-US" dirty="0"/>
           </a:p>
@@ -3295,7 +3295,7 @@
             <a:fld id="{B61BEF0D-F0BB-DE4B-95CE-6DB70DBA9567}" type="datetimeFigureOut">
               <a:rPr lang="en-US"/>
               <a:pPr/>
-              <a:t>12/21/16</a:t>
+              <a:t>4/6/17</a:t>
             </a:fld>
             <a:endParaRPr lang="en-US" dirty="0"/>
           </a:p>
@@ -3530,7 +3530,7 @@
             <a:fld id="{B61BEF0D-F0BB-DE4B-95CE-6DB70DBA9567}" type="datetimeFigureOut">
               <a:rPr lang="en-US"/>
               <a:pPr/>
-              <a:t>12/21/16</a:t>
+              <a:t>4/6/17</a:t>
             </a:fld>
             <a:endParaRPr lang="en-US" dirty="0"/>
           </a:p>
@@ -3727,7 +3727,7 @@
             <a:fld id="{B61BEF0D-F0BB-DE4B-95CE-6DB70DBA9567}" type="datetimeFigureOut">
               <a:rPr lang="en-US"/>
               <a:pPr/>
-              <a:t>12/21/16</a:t>
+              <a:t>4/6/17</a:t>
             </a:fld>
             <a:endParaRPr lang="en-US" dirty="0"/>
           </a:p>
@@ -4000,7 +4000,7 @@
             <a:fld id="{B61BEF0D-F0BB-DE4B-95CE-6DB70DBA9567}" type="datetimeFigureOut">
               <a:rPr lang="en-US"/>
               <a:pPr/>
-              <a:t>12/21/16</a:t>
+              <a:t>4/6/17</a:t>
             </a:fld>
             <a:endParaRPr lang="en-US" dirty="0"/>
           </a:p>
@@ -4263,7 +4263,7 @@
             <a:fld id="{B61BEF0D-F0BB-DE4B-95CE-6DB70DBA9567}" type="datetimeFigureOut">
               <a:rPr lang="en-US"/>
               <a:pPr/>
-              <a:t>12/21/16</a:t>
+              <a:t>4/6/17</a:t>
             </a:fld>
             <a:endParaRPr lang="en-US" dirty="0"/>
           </a:p>
@@ -4634,7 +4634,7 @@
             <a:fld id="{B61BEF0D-F0BB-DE4B-95CE-6DB70DBA9567}" type="datetimeFigureOut">
               <a:rPr lang="en-US"/>
               <a:pPr/>
-              <a:t>12/21/16</a:t>
+              <a:t>4/6/17</a:t>
             </a:fld>
             <a:endParaRPr lang="en-US" dirty="0"/>
           </a:p>
@@ -4779,7 +4779,7 @@
             <a:fld id="{B61BEF0D-F0BB-DE4B-95CE-6DB70DBA9567}" type="datetimeFigureOut">
               <a:rPr lang="en-US"/>
               <a:pPr/>
-              <a:t>12/21/16</a:t>
+              <a:t>4/6/17</a:t>
             </a:fld>
             <a:endParaRPr lang="en-US" dirty="0"/>
           </a:p>
@@ -4901,7 +4901,7 @@
             <a:fld id="{B61BEF0D-F0BB-DE4B-95CE-6DB70DBA9567}" type="datetimeFigureOut">
               <a:rPr lang="en-US"/>
               <a:pPr/>
-              <a:t>12/21/16</a:t>
+              <a:t>4/6/17</a:t>
             </a:fld>
             <a:endParaRPr lang="en-US" dirty="0"/>
           </a:p>
@@ -5183,7 +5183,7 @@
             <a:fld id="{B61BEF0D-F0BB-DE4B-95CE-6DB70DBA9567}" type="datetimeFigureOut">
               <a:rPr lang="en-US"/>
               <a:pPr/>
-              <a:t>12/21/16</a:t>
+              <a:t>4/6/17</a:t>
             </a:fld>
             <a:endParaRPr lang="en-US" dirty="0"/>
           </a:p>
@@ -5504,7 +5504,7 @@
             <a:fld id="{B61BEF0D-F0BB-DE4B-95CE-6DB70DBA9567}" type="datetimeFigureOut">
               <a:rPr lang="en-US"/>
               <a:pPr/>
-              <a:t>12/21/16</a:t>
+              <a:t>4/6/17</a:t>
             </a:fld>
             <a:endParaRPr lang="en-US" dirty="0"/>
           </a:p>
@@ -5715,7 +5715,7 @@
             <a:fld id="{B61BEF0D-F0BB-DE4B-95CE-6DB70DBA9567}" type="datetimeFigureOut">
               <a:rPr lang="en-US"/>
               <a:pPr/>
-              <a:t>12/21/16</a:t>
+              <a:t>4/6/17</a:t>
             </a:fld>
             <a:endParaRPr lang="en-US" dirty="0"/>
           </a:p>
@@ -8881,8 +8881,16 @@
               <a:t> </a:t>
             </a:r>
             <a:r>
+              <a:rPr lang="en-US" dirty="0"/>
+              <a:t>4</a:t>
+            </a:r>
+            <a:r>
               <a:rPr lang="en-US" dirty="0" smtClean="0"/>
-              <a:t>3 algorithms </a:t>
+              <a:t> </a:t>
+            </a:r>
+            <a:r>
+              <a:rPr lang="en-US" dirty="0" smtClean="0"/>
+              <a:t>algorithms </a:t>
             </a:r>
             <a:r>
               <a:rPr lang="mr-IN" dirty="0" smtClean="0"/>
@@ -8910,11 +8918,39 @@
                   <a:srgbClr val="FFFF00"/>
                 </a:solidFill>
               </a:rPr>
-              <a:t>Ua-Perm</a:t>
+              <a:t>Na-Perm</a:t>
             </a:r>
             <a:r>
               <a:rPr lang="en-US" dirty="0" smtClean="0"/>
-              <a:t> + </a:t>
+              <a:t> </a:t>
+            </a:r>
+            <a:r>
+              <a:rPr lang="en-US" dirty="0"/>
+              <a:t>+ </a:t>
+            </a:r>
+            <a:r>
+              <a:rPr lang="en-US" b="1" dirty="0" err="1" smtClean="0">
+                <a:solidFill>
+                  <a:srgbClr val="FFFF00"/>
+                </a:solidFill>
+              </a:rPr>
+              <a:t>Ua</a:t>
+            </a:r>
+            <a:r>
+              <a:rPr lang="en-US" b="1" dirty="0" smtClean="0">
+                <a:solidFill>
+                  <a:srgbClr val="FFFF00"/>
+                </a:solidFill>
+              </a:rPr>
+              <a:t>-Perm</a:t>
+            </a:r>
+            <a:r>
+              <a:rPr lang="en-US" dirty="0" smtClean="0"/>
+              <a:t> </a:t>
+            </a:r>
+            <a:r>
+              <a:rPr lang="en-US" dirty="0" smtClean="0"/>
+              <a:t>+ </a:t>
             </a:r>
             <a:r>
               <a:rPr lang="en-US" b="1" dirty="0" smtClean="0">
@@ -8949,31 +8985,89 @@
               <a:t>		</a:t>
             </a:r>
             <a:r>
+              <a:rPr lang="en-GB" b="1" dirty="0" smtClean="0"/>
+              <a:t>37 </a:t>
+            </a:r>
+            <a:r>
+              <a:rPr lang="en-GB" dirty="0" smtClean="0"/>
+              <a:t>moves</a:t>
+            </a:r>
+            <a:r>
+              <a:rPr lang="en-GB" dirty="0"/>
+              <a:t>, </a:t>
+            </a:r>
+            <a:r>
               <a:rPr lang="en-GB" b="1" dirty="0"/>
-              <a:t>46 </a:t>
+              <a:t>3</a:t>
+            </a:r>
+            <a:r>
+              <a:rPr lang="en-GB" b="1" dirty="0" smtClean="0"/>
+              <a:t> </a:t>
+            </a:r>
+            <a:r>
+              <a:rPr lang="en-GB" dirty="0" smtClean="0"/>
+              <a:t>looks</a:t>
+            </a:r>
+          </a:p>
+          <a:p>
+            <a:pPr lvl="1"/>
+            <a:r>
+              <a:rPr lang="en-GB" b="1" dirty="0" smtClean="0">
+                <a:solidFill>
+                  <a:srgbClr val="FFFF00"/>
+                </a:solidFill>
+              </a:rPr>
+              <a:t>“Weighted </a:t>
+            </a:r>
+            <a:r>
+              <a:rPr lang="en-GB" b="1" dirty="0">
+                <a:solidFill>
+                  <a:srgbClr val="FFFF00"/>
+                </a:solidFill>
+              </a:rPr>
+              <a:t>Average” 	</a:t>
+            </a:r>
+            <a:r>
+              <a:rPr lang="en-GB" b="1" dirty="0" smtClean="0"/>
+              <a:t>22.8 </a:t>
             </a:r>
             <a:r>
               <a:rPr lang="en-GB" dirty="0"/>
               <a:t>moves, </a:t>
             </a:r>
             <a:r>
-              <a:rPr lang="en-GB" b="1" dirty="0"/>
-              <a:t>4 </a:t>
+              <a:rPr lang="en-GB" b="1" dirty="0" smtClean="0"/>
+              <a:t>2.3 </a:t>
             </a:r>
             <a:r>
               <a:rPr lang="en-GB" dirty="0" smtClean="0"/>
               <a:t>looks</a:t>
             </a:r>
+            <a:endParaRPr lang="en-GB" dirty="0"/>
           </a:p>
           <a:p>
             <a:pPr lvl="1"/>
+            <a:endParaRPr lang="en-GB" dirty="0" smtClean="0"/>
+          </a:p>
+          <a:p>
+            <a:pPr marL="0" indent="0">
+              <a:buNone/>
+            </a:pPr>
+            <a:r>
+              <a:rPr lang="en-GB" dirty="0" smtClean="0"/>
+              <a:t>Comparison</a:t>
+            </a:r>
+            <a:endParaRPr lang="en-US" dirty="0" smtClean="0"/>
+          </a:p>
+          <a:p>
+            <a:pPr lvl="1"/>
             <a:r>
               <a:rPr lang="en-GB" b="1" dirty="0" smtClean="0">
                 <a:solidFill>
                   <a:srgbClr val="FFFF00"/>
                 </a:solidFill>
               </a:rPr>
-              <a:t>“Weighted </a:t>
+              <a:t>“Worst Case”</a:t>
             </a:r>
             <a:r>
               <a:rPr lang="en-GB" b="1" dirty="0">
@@ -8981,65 +9075,27 @@
                   <a:srgbClr val="FFFF00"/>
                 </a:solidFill>
               </a:rPr>
-              <a:t>Average” 	</a:t>
+              <a:t>		</a:t>
+            </a:r>
+            <a:r>
+              <a:rPr lang="en-GB" dirty="0" smtClean="0"/>
+              <a:t>“Improver” method saves </a:t>
             </a:r>
             <a:r>
               <a:rPr lang="en-GB" b="1" dirty="0" smtClean="0"/>
-              <a:t>24.3 </a:t>
+              <a:t>31</a:t>
+            </a:r>
+            <a:r>
+              <a:rPr lang="en-GB" dirty="0" smtClean="0"/>
+              <a:t> </a:t>
             </a:r>
             <a:r>
               <a:rPr lang="en-GB" dirty="0"/>
               <a:t>moves, </a:t>
             </a:r>
             <a:r>
-              <a:rPr lang="en-GB" b="1" dirty="0" smtClean="0"/>
-              <a:t>2.4 </a:t>
-            </a:r>
-            <a:r>
-              <a:rPr lang="en-GB" dirty="0" smtClean="0"/>
-              <a:t>looks</a:t>
-            </a:r>
-            <a:endParaRPr lang="en-GB" dirty="0"/>
-          </a:p>
-          <a:p>
-            <a:pPr lvl="1"/>
-            <a:endParaRPr lang="en-GB" dirty="0" smtClean="0"/>
-          </a:p>
-          <a:p>
-            <a:pPr marL="0" indent="0">
-              <a:buNone/>
-            </a:pPr>
-            <a:r>
-              <a:rPr lang="en-GB" dirty="0" smtClean="0"/>
-              <a:t>Comparison</a:t>
-            </a:r>
-            <a:endParaRPr lang="en-US" dirty="0" smtClean="0"/>
-          </a:p>
-          <a:p>
-            <a:pPr lvl="1"/>
-            <a:r>
-              <a:rPr lang="en-GB" b="1" dirty="0" smtClean="0">
-                <a:solidFill>
-                  <a:srgbClr val="FFFF00"/>
-                </a:solidFill>
-              </a:rPr>
-              <a:t>“Worst Case”</a:t>
-            </a:r>
-            <a:r>
-              <a:rPr lang="en-GB" b="1" dirty="0">
-                <a:solidFill>
-                  <a:srgbClr val="FFFF00"/>
-                </a:solidFill>
-              </a:rPr>
-              <a:t>		</a:t>
-            </a:r>
-            <a:r>
-              <a:rPr lang="en-GB" dirty="0" smtClean="0"/>
-              <a:t>“Improver” method saves </a:t>
-            </a:r>
-            <a:r>
-              <a:rPr lang="en-GB" b="1" dirty="0" smtClean="0"/>
-              <a:t>22</a:t>
+              <a:rPr lang="en-GB" b="1" dirty="0"/>
+              <a:t>5</a:t>
             </a:r>
             <a:r>
               <a:rPr lang="en-GB" dirty="0" smtClean="0"/>
@@ -9047,15 +9103,7 @@
             </a:r>
             <a:r>
               <a:rPr lang="en-GB" dirty="0"/>
-              <a:t>moves, </a:t>
-            </a:r>
-            <a:r>
-              <a:rPr lang="en-GB" b="1" dirty="0"/>
-              <a:t>4</a:t>
-            </a:r>
-            <a:r>
-              <a:rPr lang="en-GB" dirty="0"/>
-              <a:t> looks </a:t>
+              <a:t>looks </a:t>
             </a:r>
             <a:r>
               <a:rPr lang="mr-IN" dirty="0" smtClean="0"/>
@@ -9066,47 +9114,8 @@
               <a:t>&gt; </a:t>
             </a:r>
             <a:r>
-              <a:rPr lang="en-GB" b="1" dirty="0"/>
-              <a:t>32.4%</a:t>
-            </a:r>
-            <a:r>
-              <a:rPr lang="en-GB" dirty="0"/>
-              <a:t> saving</a:t>
-            </a:r>
-          </a:p>
-          <a:p>
-            <a:pPr lvl="1"/>
-            <a:r>
-              <a:rPr lang="en-GB" b="1" dirty="0" smtClean="0">
-                <a:solidFill>
-                  <a:srgbClr val="FFFF00"/>
-                </a:solidFill>
-              </a:rPr>
-              <a:t>“</a:t>
-            </a:r>
-            <a:r>
-              <a:rPr lang="en-GB" b="1" dirty="0">
-                <a:solidFill>
-                  <a:srgbClr val="FFFF00"/>
-                </a:solidFill>
-              </a:rPr>
-              <a:t>Weighted Average” 	</a:t>
-            </a:r>
-            <a:r>
-              <a:rPr lang="en-GB" dirty="0" smtClean="0"/>
-              <a:t>“Improver</a:t>
-            </a:r>
-            <a:r>
-              <a:rPr lang="en-GB" smtClean="0"/>
-              <a:t>” </a:t>
-            </a:r>
-            <a:r>
-              <a:rPr lang="en-GB"/>
-              <a:t>method saves </a:t>
-            </a:r>
-            <a:r>
               <a:rPr lang="en-GB" b="1" dirty="0" smtClean="0"/>
-              <a:t>17.8</a:t>
+              <a:t>45.6%</a:t>
             </a:r>
             <a:r>
               <a:rPr lang="en-GB" dirty="0" smtClean="0"/>
@@ -9114,6 +9123,45 @@
             </a:r>
             <a:r>
               <a:rPr lang="en-GB" dirty="0"/>
+              <a:t>saving</a:t>
+            </a:r>
+          </a:p>
+          <a:p>
+            <a:pPr lvl="1"/>
+            <a:r>
+              <a:rPr lang="en-GB" b="1" dirty="0" smtClean="0">
+                <a:solidFill>
+                  <a:srgbClr val="FFFF00"/>
+                </a:solidFill>
+              </a:rPr>
+              <a:t>“</a:t>
+            </a:r>
+            <a:r>
+              <a:rPr lang="en-GB" b="1" dirty="0">
+                <a:solidFill>
+                  <a:srgbClr val="FFFF00"/>
+                </a:solidFill>
+              </a:rPr>
+              <a:t>Weighted Average” 	</a:t>
+            </a:r>
+            <a:r>
+              <a:rPr lang="en-GB" dirty="0" smtClean="0"/>
+              <a:t>“Improver” </a:t>
+            </a:r>
+            <a:r>
+              <a:rPr lang="en-GB" dirty="0"/>
+              <a:t>method saves </a:t>
+            </a:r>
+            <a:r>
+              <a:rPr lang="en-GB" b="1" dirty="0" smtClean="0"/>
+              <a:t>19.3</a:t>
+            </a:r>
+            <a:r>
+              <a:rPr lang="en-GB" dirty="0" smtClean="0"/>
+              <a:t> </a:t>
+            </a:r>
+            <a:r>
+              <a:rPr lang="en-GB" dirty="0"/>
               <a:t>moves, </a:t>
             </a:r>
             <a:r>
@@ -9134,11 +9182,15 @@
             </a:r>
             <a:r>
               <a:rPr lang="en-GB" b="1" dirty="0" smtClean="0"/>
-              <a:t>42.3%</a:t>
+              <a:t>45.9%</a:t>
             </a:r>
             <a:r>
               <a:rPr lang="en-GB" dirty="0" smtClean="0"/>
-              <a:t> saving</a:t>
+              <a:t> </a:t>
+            </a:r>
+            <a:r>
+              <a:rPr lang="en-GB" dirty="0" smtClean="0"/>
+              <a:t>saving</a:t>
             </a:r>
           </a:p>
           <a:p>
@@ -9518,8 +9570,16 @@
               <a:t>“Improver” method will use </a:t>
             </a:r>
             <a:r>
+              <a:rPr lang="en-GB" dirty="0"/>
+              <a:t>4</a:t>
+            </a:r>
+            <a:r>
               <a:rPr lang="en-GB" dirty="0" smtClean="0"/>
-              <a:t>3 shorter but less intuitive algorithms</a:t>
+              <a:t> </a:t>
+            </a:r>
+            <a:r>
+              <a:rPr lang="en-GB" dirty="0" smtClean="0"/>
+              <a:t>shorter but less intuitive algorithms</a:t>
             </a:r>
             <a:endParaRPr lang="en-GB" dirty="0"/>
           </a:p>
@@ -9527,7 +9587,11 @@
             <a:pPr lvl="1"/>
             <a:r>
               <a:rPr lang="en-GB" dirty="0" smtClean="0"/>
-              <a:t>11-move algorithm </a:t>
+              <a:t>11-move </a:t>
+            </a:r>
+            <a:r>
+              <a:rPr lang="en-GB" dirty="0" smtClean="0"/>
+              <a:t>and 14-move algorithms </a:t>
             </a:r>
             <a:r>
               <a:rPr lang="en-GB" dirty="0"/>
@@ -9542,12 +9606,36 @@
               <a:t>(</a:t>
             </a:r>
             <a:r>
-              <a:rPr lang="en-GB" b="1" dirty="0">
-                <a:solidFill>
-                  <a:srgbClr val="FFFF00"/>
-                </a:solidFill>
-              </a:rPr>
-              <a:t>Jb-Perm</a:t>
+              <a:rPr lang="en-GB" b="1" dirty="0" err="1" smtClean="0">
+                <a:solidFill>
+                  <a:srgbClr val="FFFF00"/>
+                </a:solidFill>
+              </a:rPr>
+              <a:t>Jb</a:t>
+            </a:r>
+            <a:r>
+              <a:rPr lang="en-GB" b="1" dirty="0" smtClean="0">
+                <a:solidFill>
+                  <a:srgbClr val="FFFF00"/>
+                </a:solidFill>
+              </a:rPr>
+              <a:t>-Perm </a:t>
+            </a:r>
+            <a:r>
+              <a:rPr lang="en-GB" dirty="0"/>
+              <a:t>and</a:t>
+            </a:r>
+            <a:r>
+              <a:rPr lang="en-GB" b="1" dirty="0"/>
+              <a:t> </a:t>
+            </a:r>
+            <a:r>
+              <a:rPr lang="en-GB" b="1" dirty="0" smtClean="0">
+                <a:solidFill>
+                  <a:srgbClr val="FFFF00"/>
+                </a:solidFill>
+              </a:rPr>
+              <a:t>Na-Perm</a:t>
             </a:r>
             <a:r>
               <a:rPr lang="en-GB" dirty="0" smtClean="0"/>
@@ -9664,15 +9752,7 @@
             </a:r>
             <a:r>
               <a:rPr lang="en-GB" dirty="0" smtClean="0"/>
-              <a:t>will be </a:t>
-            </a:r>
-            <a:r>
-              <a:rPr lang="en-GB" smtClean="0"/>
-              <a:t>slightly trickier to </a:t>
-            </a:r>
-            <a:r>
-              <a:rPr lang="en-GB" dirty="0" smtClean="0"/>
-              <a:t>learn but well worth the effort!</a:t>
+              <a:t>will be slightly trickier to learn but well worth the effort!</a:t>
             </a:r>
             <a:endParaRPr lang="en-GB" dirty="0"/>
           </a:p>
@@ -10433,7 +10513,11 @@
           <a:p>
             <a:r>
               <a:rPr lang="en-US" dirty="0" smtClean="0"/>
-              <a:t>CPLL Algorithm</a:t>
+              <a:t>CPLL </a:t>
+            </a:r>
+            <a:r>
+              <a:rPr lang="en-US" dirty="0"/>
+              <a:t>Algorithms</a:t>
             </a:r>
             <a:endParaRPr lang="en-US" dirty="0"/>
           </a:p>
@@ -10487,7 +10571,7 @@
           <a:p>
             <a:r>
               <a:rPr lang="en-US" sz="1700" dirty="0" smtClean="0"/>
-              <a:t>The </a:t>
+              <a:t>The first </a:t>
             </a:r>
             <a:r>
               <a:rPr lang="en-US" sz="1700" b="1" dirty="0" smtClean="0">
@@ -10499,7 +10583,11 @@
             </a:r>
             <a:r>
               <a:rPr lang="en-US" sz="1700" dirty="0" smtClean="0"/>
-              <a:t> algorithm that will be used is </a:t>
+              <a:t> algorithm </a:t>
+            </a:r>
+            <a:r>
+              <a:rPr lang="en-US" sz="1700" dirty="0" smtClean="0"/>
+              <a:t>(adjacent corner swap) is </a:t>
             </a:r>
             <a:r>
               <a:rPr lang="en-US" sz="1600" b="1" dirty="0" smtClean="0">
@@ -10764,7 +10852,31 @@
             </a:r>
             <a:r>
               <a:rPr lang="en-US" sz="1500" dirty="0" smtClean="0"/>
-              <a:t>which swaps 2 LL corners and 2 LL edges</a:t>
+              <a:t>which swaps </a:t>
+            </a:r>
+            <a:r>
+              <a:rPr lang="en-US" sz="1500" dirty="0" smtClean="0"/>
+              <a:t>2 </a:t>
+            </a:r>
+            <a:r>
+              <a:rPr lang="en-US" sz="1500" dirty="0" smtClean="0"/>
+              <a:t>diagonal</a:t>
+            </a:r>
+            <a:r>
+              <a:rPr lang="en-US" sz="1500" dirty="0" smtClean="0"/>
+              <a:t> </a:t>
+            </a:r>
+            <a:r>
+              <a:rPr lang="en-US" sz="1500" dirty="0" smtClean="0"/>
+              <a:t>LL corners </a:t>
+            </a:r>
+            <a:r>
+              <a:rPr lang="en-US" sz="1500" dirty="0" smtClean="0"/>
+              <a:t>+ 2 </a:t>
+            </a:r>
+            <a:r>
+              <a:rPr lang="en-US" sz="1500" dirty="0" smtClean="0"/>
+              <a:t>LL edges</a:t>
             </a:r>
           </a:p>
           <a:p>
@@ -10772,30 +10884,174 @@
           </a:p>
           <a:p>
             <a:r>
-              <a:rPr lang="en-GB" sz="1700" dirty="0" smtClean="0"/>
-              <a:t>Explanation of the algorithm</a:t>
-            </a:r>
-            <a:endParaRPr lang="en-US" sz="1700" dirty="0" smtClean="0"/>
-          </a:p>
-          <a:p>
-            <a:pPr lvl="1"/>
-            <a:r>
-              <a:rPr lang="en-US" sz="1500" dirty="0" smtClean="0"/>
+              <a:rPr lang="en-US" sz="1700" dirty="0"/>
               <a:t>The </a:t>
             </a:r>
             <a:r>
-              <a:rPr lang="en-US" sz="1500" b="1" dirty="0" smtClean="0">
-                <a:solidFill>
-                  <a:srgbClr val="FFFF00"/>
-                </a:solidFill>
-              </a:rPr>
-              <a:t>Anti-Sune</a:t>
-            </a:r>
-            <a:r>
-              <a:rPr lang="en-US" sz="1500" dirty="0" smtClean="0"/>
-              <a:t> algorithm disorients 3 of the LL corners and permutes 3 of the LL edges</a:t>
-            </a:r>
-            <a:endParaRPr lang="en-US" sz="1500" b="1" dirty="0" smtClean="0">
+              <a:rPr lang="en-US" sz="1700" dirty="0" smtClean="0"/>
+              <a:t>second </a:t>
+            </a:r>
+            <a:r>
+              <a:rPr lang="en-US" sz="1700" b="1" dirty="0" smtClean="0">
+                <a:solidFill>
+                  <a:srgbClr val="FFFF00"/>
+                </a:solidFill>
+              </a:rPr>
+              <a:t>CPLL</a:t>
+            </a:r>
+            <a:r>
+              <a:rPr lang="en-US" sz="1700" dirty="0" smtClean="0"/>
+              <a:t> </a:t>
+            </a:r>
+            <a:r>
+              <a:rPr lang="en-US" sz="1700" dirty="0"/>
+              <a:t>algorithm </a:t>
+            </a:r>
+            <a:r>
+              <a:rPr lang="en-US" sz="1700" dirty="0" smtClean="0"/>
+              <a:t>(diagonal corner swap) </a:t>
+            </a:r>
+            <a:r>
+              <a:rPr lang="en-US" sz="1700" dirty="0"/>
+              <a:t>is </a:t>
+            </a:r>
+            <a:r>
+              <a:rPr lang="mr-IN" sz="1600" b="1" dirty="0">
+                <a:solidFill>
+                  <a:srgbClr val="FFFF00"/>
+                </a:solidFill>
+              </a:rPr>
+              <a:t>(</a:t>
+            </a:r>
+            <a:r>
+              <a:rPr lang="mr-IN" sz="1600" b="1" dirty="0" err="1">
+                <a:solidFill>
+                  <a:srgbClr val="FFFF00"/>
+                </a:solidFill>
+              </a:rPr>
+              <a:t>R</a:t>
+            </a:r>
+            <a:r>
+              <a:rPr lang="mr-IN" sz="1600" b="1" dirty="0">
+                <a:solidFill>
+                  <a:srgbClr val="FFFF00"/>
+                </a:solidFill>
+              </a:rPr>
+              <a:t> </a:t>
+            </a:r>
+            <a:r>
+              <a:rPr lang="mr-IN" sz="1600" b="1" dirty="0" err="1">
+                <a:solidFill>
+                  <a:srgbClr val="FFFF00"/>
+                </a:solidFill>
+              </a:rPr>
+              <a:t>U</a:t>
+            </a:r>
+            <a:r>
+              <a:rPr lang="mr-IN" sz="1600" b="1" dirty="0">
+                <a:solidFill>
+                  <a:srgbClr val="FFFF00"/>
+                </a:solidFill>
+              </a:rPr>
+              <a:t>' L U2' </a:t>
+            </a:r>
+            <a:r>
+              <a:rPr lang="mr-IN" sz="1600" b="1" dirty="0" err="1">
+                <a:solidFill>
+                  <a:srgbClr val="FFFF00"/>
+                </a:solidFill>
+              </a:rPr>
+              <a:t>R</a:t>
+            </a:r>
+            <a:r>
+              <a:rPr lang="mr-IN" sz="1600" b="1" dirty="0">
+                <a:solidFill>
+                  <a:srgbClr val="FFFF00"/>
+                </a:solidFill>
+              </a:rPr>
+              <a:t>' </a:t>
+            </a:r>
+            <a:r>
+              <a:rPr lang="mr-IN" sz="1600" b="1" dirty="0" err="1">
+                <a:solidFill>
+                  <a:srgbClr val="FFFF00"/>
+                </a:solidFill>
+              </a:rPr>
+              <a:t>U</a:t>
+            </a:r>
+            <a:r>
+              <a:rPr lang="mr-IN" sz="1600" b="1" dirty="0">
+                <a:solidFill>
+                  <a:srgbClr val="FFFF00"/>
+                </a:solidFill>
+              </a:rPr>
+              <a:t> L') (</a:t>
+            </a:r>
+            <a:r>
+              <a:rPr lang="mr-IN" sz="1600" b="1" dirty="0" err="1">
+                <a:solidFill>
+                  <a:srgbClr val="FFFF00"/>
+                </a:solidFill>
+              </a:rPr>
+              <a:t>R</a:t>
+            </a:r>
+            <a:r>
+              <a:rPr lang="mr-IN" sz="1600" b="1" dirty="0">
+                <a:solidFill>
+                  <a:srgbClr val="FFFF00"/>
+                </a:solidFill>
+              </a:rPr>
+              <a:t> </a:t>
+            </a:r>
+            <a:r>
+              <a:rPr lang="mr-IN" sz="1600" b="1" dirty="0" err="1">
+                <a:solidFill>
+                  <a:srgbClr val="FFFF00"/>
+                </a:solidFill>
+              </a:rPr>
+              <a:t>U</a:t>
+            </a:r>
+            <a:r>
+              <a:rPr lang="mr-IN" sz="1600" b="1" dirty="0">
+                <a:solidFill>
+                  <a:srgbClr val="FFFF00"/>
+                </a:solidFill>
+              </a:rPr>
+              <a:t>' L U2' </a:t>
+            </a:r>
+            <a:r>
+              <a:rPr lang="mr-IN" sz="1600" b="1" dirty="0" err="1">
+                <a:solidFill>
+                  <a:srgbClr val="FFFF00"/>
+                </a:solidFill>
+              </a:rPr>
+              <a:t>R</a:t>
+            </a:r>
+            <a:r>
+              <a:rPr lang="mr-IN" sz="1600" b="1" dirty="0">
+                <a:solidFill>
+                  <a:srgbClr val="FFFF00"/>
+                </a:solidFill>
+              </a:rPr>
+              <a:t>' </a:t>
+            </a:r>
+            <a:r>
+              <a:rPr lang="mr-IN" sz="1600" b="1" dirty="0" err="1">
+                <a:solidFill>
+                  <a:srgbClr val="FFFF00"/>
+                </a:solidFill>
+              </a:rPr>
+              <a:t>U</a:t>
+            </a:r>
+            <a:r>
+              <a:rPr lang="mr-IN" sz="1600" b="1" dirty="0">
+                <a:solidFill>
+                  <a:srgbClr val="FFFF00"/>
+                </a:solidFill>
+              </a:rPr>
+              <a:t> L')</a:t>
+            </a:r>
+            <a:endParaRPr lang="en-US" sz="1700" b="1" dirty="0">
               <a:solidFill>
                 <a:srgbClr val="FFFF00"/>
               </a:solidFill>
@@ -10804,61 +11060,181 @@
           <a:p>
             <a:pPr lvl="1"/>
             <a:r>
+              <a:rPr lang="en-GB" sz="1500" dirty="0" smtClean="0"/>
+              <a:t>This is a 7-move </a:t>
+            </a:r>
+            <a:r>
               <a:rPr lang="en-US" sz="1500" dirty="0" smtClean="0"/>
+              <a:t>algorithm</a:t>
+            </a:r>
+            <a:r>
+              <a:rPr lang="en-US" sz="1500" dirty="0" smtClean="0">
+                <a:solidFill>
+                  <a:srgbClr val="FFFF00"/>
+                </a:solidFill>
+              </a:rPr>
+              <a:t> </a:t>
+            </a:r>
+            <a:r>
+              <a:rPr lang="en-US" sz="1500" dirty="0"/>
+              <a:t>which manipulates two </a:t>
+            </a:r>
+            <a:r>
+              <a:rPr lang="en-US" sz="1500" b="1" dirty="0">
+                <a:solidFill>
+                  <a:srgbClr val="FFFF00"/>
+                </a:solidFill>
+              </a:rPr>
+              <a:t>F2L </a:t>
+            </a:r>
+            <a:r>
+              <a:rPr lang="en-US" sz="1500" b="1" dirty="0" smtClean="0">
+                <a:solidFill>
+                  <a:srgbClr val="FFFF00"/>
+                </a:solidFill>
+              </a:rPr>
+              <a:t>pairs</a:t>
+            </a:r>
+            <a:r>
+              <a:rPr lang="en-US" sz="1500" dirty="0" smtClean="0"/>
+              <a:t>,</a:t>
+            </a:r>
+            <a:r>
+              <a:rPr lang="en-US" sz="1500" b="1" dirty="0" smtClean="0">
+                <a:solidFill>
+                  <a:srgbClr val="FFFF00"/>
+                </a:solidFill>
+              </a:rPr>
+              <a:t> </a:t>
+            </a:r>
+            <a:r>
+              <a:rPr lang="en-US" sz="1500" dirty="0" smtClean="0"/>
+              <a:t>executed twice </a:t>
+            </a:r>
+            <a:r>
+              <a:rPr lang="mr-IN" sz="1500" dirty="0" smtClean="0"/>
+              <a:t>–</a:t>
+            </a:r>
+            <a:r>
+              <a:rPr lang="en-US" sz="1500" dirty="0" smtClean="0"/>
+              <a:t> </a:t>
+            </a:r>
+            <a:r>
+              <a:rPr lang="mr-IN" sz="1500" b="1" dirty="0" err="1" smtClean="0">
+                <a:solidFill>
+                  <a:srgbClr val="FFFF00"/>
+                </a:solidFill>
+              </a:rPr>
+              <a:t>R</a:t>
+            </a:r>
+            <a:r>
+              <a:rPr lang="mr-IN" sz="1500" b="1" dirty="0" smtClean="0">
+                <a:solidFill>
+                  <a:srgbClr val="FFFF00"/>
+                </a:solidFill>
+              </a:rPr>
+              <a:t> </a:t>
+            </a:r>
+            <a:r>
+              <a:rPr lang="mr-IN" sz="1500" b="1" dirty="0" err="1">
+                <a:solidFill>
+                  <a:srgbClr val="FFFF00"/>
+                </a:solidFill>
+              </a:rPr>
+              <a:t>U</a:t>
+            </a:r>
+            <a:r>
+              <a:rPr lang="mr-IN" sz="1500" b="1" dirty="0">
+                <a:solidFill>
+                  <a:srgbClr val="FFFF00"/>
+                </a:solidFill>
+              </a:rPr>
+              <a:t>' L U2' </a:t>
+            </a:r>
+            <a:r>
+              <a:rPr lang="mr-IN" sz="1500" b="1" dirty="0" err="1">
+                <a:solidFill>
+                  <a:srgbClr val="FFFF00"/>
+                </a:solidFill>
+              </a:rPr>
+              <a:t>R</a:t>
+            </a:r>
+            <a:r>
+              <a:rPr lang="mr-IN" sz="1500" b="1" dirty="0">
+                <a:solidFill>
+                  <a:srgbClr val="FFFF00"/>
+                </a:solidFill>
+              </a:rPr>
+              <a:t>' </a:t>
+            </a:r>
+            <a:r>
+              <a:rPr lang="mr-IN" sz="1500" b="1" dirty="0" err="1">
+                <a:solidFill>
+                  <a:srgbClr val="FFFF00"/>
+                </a:solidFill>
+              </a:rPr>
+              <a:t>U</a:t>
+            </a:r>
+            <a:r>
+              <a:rPr lang="mr-IN" sz="1500" b="1" dirty="0">
+                <a:solidFill>
+                  <a:srgbClr val="FFFF00"/>
+                </a:solidFill>
+              </a:rPr>
+              <a:t> L'</a:t>
+            </a:r>
+            <a:endParaRPr lang="en-US" sz="1500" dirty="0"/>
+          </a:p>
+          <a:p>
+            <a:pPr lvl="1"/>
+            <a:r>
+              <a:rPr lang="en-US" sz="1500" dirty="0"/>
               <a:t>The </a:t>
             </a:r>
             <a:r>
+              <a:rPr lang="en-US" sz="1500" dirty="0" smtClean="0"/>
+              <a:t>repetition of this algorithm </a:t>
+            </a:r>
+            <a:r>
+              <a:rPr lang="en-US" sz="1500" dirty="0"/>
+              <a:t>is the </a:t>
+            </a:r>
+            <a:r>
               <a:rPr lang="en-US" sz="1500" b="1" dirty="0" smtClean="0">
                 <a:solidFill>
                   <a:srgbClr val="FFFF00"/>
                 </a:solidFill>
               </a:rPr>
-              <a:t>Niklas</a:t>
-            </a:r>
-            <a:r>
-              <a:rPr lang="en-US" sz="1500" dirty="0" smtClean="0">
-                <a:solidFill>
-                  <a:srgbClr val="FFFF00"/>
-                </a:solidFill>
-              </a:rPr>
-              <a:t> </a:t>
+              <a:t>Na-Perm </a:t>
+            </a:r>
+            <a:r>
+              <a:rPr lang="en-US" sz="1500" dirty="0"/>
+              <a:t>which swaps </a:t>
             </a:r>
             <a:r>
               <a:rPr lang="en-US" sz="1500" dirty="0" smtClean="0"/>
-              <a:t>algorithm re-orients the LL corners and changes their permutation</a:t>
-            </a:r>
-            <a:endParaRPr lang="en-US" sz="1500" b="1" dirty="0" smtClean="0">
-              <a:solidFill>
-                <a:srgbClr val="FFFF00"/>
-              </a:solidFill>
-            </a:endParaRPr>
+              <a:t>2 adjacent </a:t>
+            </a:r>
+            <a:r>
+              <a:rPr lang="en-US" sz="1500" dirty="0"/>
+              <a:t>LL corners </a:t>
+            </a:r>
+            <a:r>
+              <a:rPr lang="en-US" sz="1500" dirty="0" smtClean="0"/>
+              <a:t>+ 2 </a:t>
+            </a:r>
+            <a:r>
+              <a:rPr lang="en-US" sz="1500" dirty="0"/>
+              <a:t>LL </a:t>
+            </a:r>
+            <a:r>
+              <a:rPr lang="en-US" sz="1500" dirty="0" smtClean="0"/>
+              <a:t>edges</a:t>
+            </a:r>
           </a:p>
           <a:p>
             <a:pPr lvl="1"/>
-            <a:r>
-              <a:rPr lang="en-US" sz="1500" dirty="0" smtClean="0"/>
-              <a:t>The combined effect of these two algorithms is to maintain the </a:t>
-            </a:r>
-            <a:r>
-              <a:rPr lang="en-US" sz="1500" b="1" dirty="0" smtClean="0">
-                <a:solidFill>
-                  <a:srgbClr val="FFFF00"/>
-                </a:solidFill>
-              </a:rPr>
-              <a:t>OLL </a:t>
-            </a:r>
-            <a:r>
-              <a:rPr lang="en-US" sz="1500" dirty="0" smtClean="0"/>
-              <a:t>but change the </a:t>
-            </a:r>
-            <a:r>
-              <a:rPr lang="en-US" sz="1500" b="1" dirty="0" smtClean="0">
-                <a:solidFill>
-                  <a:srgbClr val="FFFF00"/>
-                </a:solidFill>
-              </a:rPr>
-              <a:t>PLL</a:t>
-            </a:r>
+            <a:endParaRPr lang="en-US" sz="1500" dirty="0"/>
           </a:p>
         </p:txBody>
       </p:sp>
@@ -11520,60 +11896,8 @@
               <a:t> </a:t>
             </a:r>
             <a:r>
-              <a:rPr lang="en-US" dirty="0"/>
-              <a:t>-&gt; </a:t>
-            </a:r>
-            <a:r>
               <a:rPr lang="en-US" dirty="0" smtClean="0"/>
-              <a:t>“</a:t>
-            </a:r>
-            <a:r>
-              <a:rPr lang="en-US" b="1" dirty="0">
-                <a:solidFill>
-                  <a:srgbClr val="FFFF00"/>
-                </a:solidFill>
-              </a:rPr>
-              <a:t>a</a:t>
-            </a:r>
-            <a:r>
-              <a:rPr lang="en-US" b="1" dirty="0" smtClean="0">
-                <a:solidFill>
-                  <a:srgbClr val="FFFF00"/>
-                </a:solidFill>
-              </a:rPr>
-              <a:t>djacent</a:t>
-            </a:r>
-            <a:r>
-              <a:rPr lang="en-US" dirty="0" smtClean="0"/>
-              <a:t> </a:t>
-            </a:r>
-            <a:r>
-              <a:rPr lang="en-US" b="1" dirty="0">
-                <a:solidFill>
-                  <a:srgbClr val="FFFF00"/>
-                </a:solidFill>
-              </a:rPr>
-              <a:t>corner </a:t>
-            </a:r>
-            <a:r>
-              <a:rPr lang="en-US" b="1" dirty="0" smtClean="0">
-                <a:solidFill>
-                  <a:srgbClr val="FFFF00"/>
-                </a:solidFill>
-              </a:rPr>
-              <a:t>swap</a:t>
-            </a:r>
-            <a:r>
-              <a:rPr lang="en-US" dirty="0" smtClean="0"/>
-              <a:t>” </a:t>
-            </a:r>
-            <a:r>
-              <a:rPr lang="en-US" dirty="0"/>
-              <a:t>-&gt; </a:t>
-            </a:r>
-            <a:r>
-              <a:rPr lang="en-US" dirty="0" smtClean="0"/>
-              <a:t>“</a:t>
+              <a:t>-&gt; “</a:t>
             </a:r>
             <a:r>
               <a:rPr lang="en-US" b="1" dirty="0">
@@ -11606,36 +11930,16 @@
               <a:t>Setup: </a:t>
             </a:r>
             <a:r>
-              <a:rPr lang="en-US" dirty="0"/>
-              <a:t>Ensure the “</a:t>
-            </a:r>
-            <a:r>
-              <a:rPr lang="en-US" b="1" dirty="0">
-                <a:solidFill>
-                  <a:srgbClr val="FFFF00"/>
-                </a:solidFill>
-              </a:rPr>
-              <a:t>Headlights</a:t>
-            </a:r>
-            <a:r>
-              <a:rPr lang="en-US" dirty="0"/>
-              <a:t>” are on the left before executing </a:t>
-            </a:r>
-            <a:r>
               <a:rPr lang="en-US" dirty="0" smtClean="0"/>
-              <a:t>the ”</a:t>
-            </a:r>
-            <a:r>
-              <a:rPr lang="en-US" b="1" dirty="0" smtClean="0">
-                <a:solidFill>
-                  <a:srgbClr val="FFFF00"/>
-                </a:solidFill>
-              </a:rPr>
-              <a:t>adjacent corner swap</a:t>
-            </a:r>
-            <a:r>
-              <a:rPr lang="en-US" dirty="0" smtClean="0"/>
-              <a:t>”</a:t>
+              <a:t>No setup required</a:t>
+            </a:r>
+            <a:r>
+              <a:rPr lang="mr-IN" dirty="0" smtClean="0"/>
+              <a:t>…</a:t>
+            </a:r>
+            <a:r>
+              <a:rPr lang="en-GB" dirty="0" smtClean="0"/>
+              <a:t> just execute the algorithm</a:t>
             </a:r>
             <a:endParaRPr lang="en-US" dirty="0"/>
           </a:p>
@@ -11652,109 +11956,146 @@
               <a:t>: </a:t>
             </a:r>
             <a:r>
-              <a:rPr lang="en-US" b="1" dirty="0" smtClean="0">
-                <a:solidFill>
-                  <a:srgbClr val="FFFF00"/>
-                </a:solidFill>
-              </a:rPr>
-              <a:t>(R </a:t>
-            </a:r>
-            <a:r>
-              <a:rPr lang="en-US" b="1" dirty="0">
-                <a:solidFill>
-                  <a:srgbClr val="FFFF00"/>
-                </a:solidFill>
-              </a:rPr>
-              <a:t>U2 R’ U’ </a:t>
-            </a:r>
-            <a:r>
-              <a:rPr lang="en-US" b="1" dirty="0" smtClean="0">
-                <a:solidFill>
-                  <a:srgbClr val="FFFF00"/>
-                </a:solidFill>
-              </a:rPr>
-              <a:t>R </a:t>
-            </a:r>
-            <a:r>
-              <a:rPr lang="en-US" b="1" dirty="0">
-                <a:solidFill>
-                  <a:srgbClr val="FFFF00"/>
-                </a:solidFill>
-              </a:rPr>
-              <a:t>U2 </a:t>
-            </a:r>
-            <a:r>
-              <a:rPr lang="en-US" b="1" dirty="0" smtClean="0">
-                <a:solidFill>
-                  <a:srgbClr val="FFFF00"/>
-                </a:solidFill>
-              </a:rPr>
-              <a:t>L</a:t>
-            </a:r>
-            <a:r>
-              <a:rPr lang="en-US" b="1" dirty="0">
-                <a:solidFill>
-                  <a:srgbClr val="FFFF00"/>
-                </a:solidFill>
-              </a:rPr>
-              <a:t>’ U R’ U’ </a:t>
-            </a:r>
-            <a:r>
-              <a:rPr lang="en-US" b="1" dirty="0" smtClean="0">
-                <a:solidFill>
-                  <a:srgbClr val="FFFF00"/>
-                </a:solidFill>
-              </a:rPr>
-              <a:t>L) U2 </a:t>
-            </a:r>
-            <a:r>
-              <a:rPr lang="en-US" b="1" dirty="0">
-                <a:solidFill>
-                  <a:srgbClr val="FFFF00"/>
-                </a:solidFill>
-              </a:rPr>
-              <a:t>(R U2 R’ U’ </a:t>
-            </a:r>
-            <a:r>
-              <a:rPr lang="en-US" b="1" dirty="0" smtClean="0">
-                <a:solidFill>
-                  <a:srgbClr val="FFFF00"/>
-                </a:solidFill>
-              </a:rPr>
-              <a:t>R </a:t>
-            </a:r>
-            <a:r>
-              <a:rPr lang="en-US" b="1" dirty="0">
-                <a:solidFill>
-                  <a:srgbClr val="FFFF00"/>
-                </a:solidFill>
-              </a:rPr>
-              <a:t>U2 </a:t>
-            </a:r>
-            <a:r>
-              <a:rPr lang="en-US" b="1" dirty="0" smtClean="0">
-                <a:solidFill>
-                  <a:srgbClr val="FFFF00"/>
-                </a:solidFill>
-              </a:rPr>
-              <a:t>L</a:t>
-            </a:r>
-            <a:r>
-              <a:rPr lang="en-US" b="1" dirty="0">
-                <a:solidFill>
-                  <a:srgbClr val="FFFF00"/>
-                </a:solidFill>
-              </a:rPr>
-              <a:t>’ U R’ U’ </a:t>
-            </a:r>
-            <a:r>
-              <a:rPr lang="en-US" b="1" dirty="0" smtClean="0">
-                <a:solidFill>
-                  <a:srgbClr val="FFFF00"/>
-                </a:solidFill>
-              </a:rPr>
-              <a:t>L)</a:t>
-            </a:r>
+              <a:rPr lang="mr-IN" b="1" dirty="0">
+                <a:solidFill>
+                  <a:srgbClr val="FFFF00"/>
+                </a:solidFill>
+              </a:rPr>
+              <a:t>(</a:t>
+            </a:r>
+            <a:r>
+              <a:rPr lang="mr-IN" b="1" dirty="0" err="1">
+                <a:solidFill>
+                  <a:srgbClr val="FFFF00"/>
+                </a:solidFill>
+              </a:rPr>
+              <a:t>R</a:t>
+            </a:r>
+            <a:r>
+              <a:rPr lang="mr-IN" b="1" dirty="0">
+                <a:solidFill>
+                  <a:srgbClr val="FFFF00"/>
+                </a:solidFill>
+              </a:rPr>
+              <a:t> </a:t>
+            </a:r>
+            <a:r>
+              <a:rPr lang="mr-IN" b="1" dirty="0" err="1">
+                <a:solidFill>
+                  <a:srgbClr val="FFFF00"/>
+                </a:solidFill>
+              </a:rPr>
+              <a:t>U</a:t>
+            </a:r>
+            <a:r>
+              <a:rPr lang="mr-IN" b="1" dirty="0">
+                <a:solidFill>
+                  <a:srgbClr val="FFFF00"/>
+                </a:solidFill>
+              </a:rPr>
+              <a:t>' L U2' </a:t>
+            </a:r>
+            <a:r>
+              <a:rPr lang="mr-IN" b="1" dirty="0" err="1">
+                <a:solidFill>
+                  <a:srgbClr val="FFFF00"/>
+                </a:solidFill>
+              </a:rPr>
+              <a:t>R</a:t>
+            </a:r>
+            <a:r>
+              <a:rPr lang="mr-IN" b="1" dirty="0">
+                <a:solidFill>
+                  <a:srgbClr val="FFFF00"/>
+                </a:solidFill>
+              </a:rPr>
+              <a:t>' </a:t>
+            </a:r>
+            <a:r>
+              <a:rPr lang="mr-IN" b="1" dirty="0" err="1">
+                <a:solidFill>
+                  <a:srgbClr val="FFFF00"/>
+                </a:solidFill>
+              </a:rPr>
+              <a:t>U</a:t>
+            </a:r>
+            <a:r>
+              <a:rPr lang="mr-IN" b="1" dirty="0">
+                <a:solidFill>
+                  <a:srgbClr val="FFFF00"/>
+                </a:solidFill>
+              </a:rPr>
+              <a:t> L') (</a:t>
+            </a:r>
+            <a:r>
+              <a:rPr lang="mr-IN" b="1" dirty="0" err="1">
+                <a:solidFill>
+                  <a:srgbClr val="FFFF00"/>
+                </a:solidFill>
+              </a:rPr>
+              <a:t>R</a:t>
+            </a:r>
+            <a:r>
+              <a:rPr lang="mr-IN" b="1" dirty="0">
+                <a:solidFill>
+                  <a:srgbClr val="FFFF00"/>
+                </a:solidFill>
+              </a:rPr>
+              <a:t> </a:t>
+            </a:r>
+            <a:r>
+              <a:rPr lang="mr-IN" b="1" dirty="0" err="1">
+                <a:solidFill>
+                  <a:srgbClr val="FFFF00"/>
+                </a:solidFill>
+              </a:rPr>
+              <a:t>U</a:t>
+            </a:r>
+            <a:r>
+              <a:rPr lang="mr-IN" b="1" dirty="0">
+                <a:solidFill>
+                  <a:srgbClr val="FFFF00"/>
+                </a:solidFill>
+              </a:rPr>
+              <a:t>' L U2' </a:t>
+            </a:r>
+            <a:r>
+              <a:rPr lang="mr-IN" b="1" dirty="0" err="1">
+                <a:solidFill>
+                  <a:srgbClr val="FFFF00"/>
+                </a:solidFill>
+              </a:rPr>
+              <a:t>R</a:t>
+            </a:r>
+            <a:r>
+              <a:rPr lang="mr-IN" b="1" dirty="0">
+                <a:solidFill>
+                  <a:srgbClr val="FFFF00"/>
+                </a:solidFill>
+              </a:rPr>
+              <a:t>' </a:t>
+            </a:r>
+            <a:r>
+              <a:rPr lang="mr-IN" b="1" dirty="0" err="1">
+                <a:solidFill>
+                  <a:srgbClr val="FFFF00"/>
+                </a:solidFill>
+              </a:rPr>
+              <a:t>U</a:t>
+            </a:r>
+            <a:r>
+              <a:rPr lang="mr-IN" b="1" dirty="0">
+                <a:solidFill>
+                  <a:srgbClr val="FFFF00"/>
+                </a:solidFill>
+              </a:rPr>
+              <a:t> L')</a:t>
+            </a:r>
+            <a:endParaRPr lang="en-US" b="1" dirty="0" smtClean="0">
+              <a:solidFill>
+                <a:srgbClr val="FFFF00"/>
+              </a:solidFill>
+            </a:endParaRPr>
           </a:p>
           <a:p>
             <a:endParaRPr lang="en-US" dirty="0"/>
@@ -11816,7 +12157,7 @@
       </p:sp>
       <p:pic>
         <p:nvPicPr>
-          <p:cNvPr id="9" name="Picture 8"/>
+          <p:cNvPr id="10" name="Picture 9"/>
           <p:cNvPicPr>
             <a:picLocks noChangeAspect="1"/>
           </p:cNvPicPr>
@@ -11836,7 +12177,7 @@
         </p:blipFill>
         <p:spPr>
           <a:xfrm>
-            <a:off x="4900184" y="4099462"/>
+            <a:off x="3651301" y="4107873"/>
             <a:ext cx="1625600" cy="1625600"/>
           </a:xfrm>
           <a:prstGeom prst="rect">
@@ -11844,9 +12185,40 @@
           </a:prstGeom>
         </p:spPr>
       </p:pic>
+      <p:sp>
+        <p:nvSpPr>
+          <p:cNvPr id="14" name="TextBox 13"/>
+          <p:cNvSpPr txBox="1"/>
+          <p:nvPr/>
+        </p:nvSpPr>
+        <p:spPr>
+          <a:xfrm>
+            <a:off x="3673844" y="5751132"/>
+            <a:ext cx="1590500" cy="369332"/>
+          </a:xfrm>
+          <a:prstGeom prst="rect">
+            <a:avLst/>
+          </a:prstGeom>
+          <a:noFill/>
+        </p:spPr>
+        <p:txBody>
+          <a:bodyPr wrap="none" rtlCol="0">
+            <a:spAutoFit/>
+          </a:bodyPr>
+          <a:lstStyle/>
+          <a:p>
+            <a:pPr algn="ctr"/>
+            <a:r>
+              <a:rPr lang="en-US" b="1" dirty="0" smtClean="0"/>
+              <a:t>Diagonal Swap</a:t>
+            </a:r>
+            <a:endParaRPr lang="en-US" b="1" dirty="0"/>
+          </a:p>
+        </p:txBody>
+      </p:sp>
       <p:pic>
         <p:nvPicPr>
-          <p:cNvPr id="10" name="Picture 9"/>
+          <p:cNvPr id="17" name="Picture 16"/>
           <p:cNvPicPr>
             <a:picLocks noChangeAspect="1"/>
           </p:cNvPicPr>
@@ -11866,7 +12238,7 @@
         </p:blipFill>
         <p:spPr>
           <a:xfrm>
-            <a:off x="2505414" y="4107873"/>
+            <a:off x="6070083" y="4099462"/>
             <a:ext cx="1625600" cy="1625600"/>
           </a:xfrm>
           <a:prstGeom prst="rect">
@@ -11874,45 +12246,15 @@
           </a:prstGeom>
         </p:spPr>
       </p:pic>
-      <p:pic>
-        <p:nvPicPr>
-          <p:cNvPr id="11" name="Picture 10"/>
-          <p:cNvPicPr>
-            <a:picLocks noChangeAspect="1"/>
-          </p:cNvPicPr>
+      <p:sp>
+        <p:nvSpPr>
+          <p:cNvPr id="18" name="Right Arrow 17"/>
+          <p:cNvSpPr/>
           <p:nvPr/>
-        </p:nvPicPr>
-        <p:blipFill>
-          <a:blip r:embed="rId4">
-            <a:extLst>
-              <a:ext uri="{28A0092B-C50C-407E-A947-70E740481C1C}">
-                <a14:useLocalDpi xmlns:a14="http://schemas.microsoft.com/office/drawing/2010/main" val="0"/>
-              </a:ext>
-            </a:extLst>
-          </a:blip>
-          <a:stretch>
-            <a:fillRect/>
-          </a:stretch>
-        </p:blipFill>
+        </p:nvSpPr>
         <p:spPr>
           <a:xfrm>
-            <a:off x="7320149" y="4099462"/>
-            <a:ext cx="1625600" cy="1625600"/>
-          </a:xfrm>
-          <a:prstGeom prst="rect">
-            <a:avLst/>
-          </a:prstGeom>
-        </p:spPr>
-      </p:pic>
-      <p:sp>
-        <p:nvSpPr>
-          <p:cNvPr id="12" name="Right Arrow 11"/>
-          <p:cNvSpPr/>
-          <p:nvPr/>
-        </p:nvSpPr>
-        <p:spPr>
-          <a:xfrm>
-            <a:off x="4308726" y="4656751"/>
+            <a:off x="5488604" y="4656752"/>
             <a:ext cx="408214" cy="511023"/>
           </a:xfrm>
           <a:prstGeom prst="rightArrow">
@@ -11954,123 +12296,13 @@
       </p:sp>
       <p:sp>
         <p:nvSpPr>
-          <p:cNvPr id="13" name="Right Arrow 12"/>
-          <p:cNvSpPr/>
+          <p:cNvPr id="19" name="TextBox 18"/>
+          <p:cNvSpPr txBox="1"/>
           <p:nvPr/>
         </p:nvSpPr>
         <p:spPr>
           <a:xfrm>
-            <a:off x="6738670" y="4656752"/>
-            <a:ext cx="408214" cy="511023"/>
-          </a:xfrm>
-          <a:prstGeom prst="rightArrow">
-            <a:avLst/>
-          </a:prstGeom>
-          <a:solidFill>
-            <a:srgbClr val="FFFF00"/>
-          </a:solidFill>
-          <a:ln>
-            <a:solidFill>
-              <a:schemeClr val="bg1"/>
-            </a:solidFill>
-          </a:ln>
-        </p:spPr>
-        <p:style>
-          <a:lnRef idx="2">
-            <a:schemeClr val="accent1">
-              <a:shade val="50000"/>
-            </a:schemeClr>
-          </a:lnRef>
-          <a:fillRef idx="1">
-            <a:schemeClr val="accent1"/>
-          </a:fillRef>
-          <a:effectRef idx="0">
-            <a:schemeClr val="accent1"/>
-          </a:effectRef>
-          <a:fontRef idx="minor">
-            <a:schemeClr val="lt1"/>
-          </a:fontRef>
-        </p:style>
-        <p:txBody>
-          <a:bodyPr rtlCol="0" anchor="ctr"/>
-          <a:lstStyle/>
-          <a:p>
-            <a:pPr algn="ctr"/>
-            <a:endParaRPr lang="en-US" dirty="0"/>
-          </a:p>
-        </p:txBody>
-      </p:sp>
-      <p:sp>
-        <p:nvSpPr>
-          <p:cNvPr id="14" name="TextBox 13"/>
-          <p:cNvSpPr txBox="1"/>
-          <p:nvPr/>
-        </p:nvSpPr>
-        <p:spPr>
-          <a:xfrm>
-            <a:off x="2527957" y="5751132"/>
-            <a:ext cx="1590500" cy="369332"/>
-          </a:xfrm>
-          <a:prstGeom prst="rect">
-            <a:avLst/>
-          </a:prstGeom>
-          <a:noFill/>
-        </p:spPr>
-        <p:txBody>
-          <a:bodyPr wrap="none" rtlCol="0">
-            <a:spAutoFit/>
-          </a:bodyPr>
-          <a:lstStyle/>
-          <a:p>
-            <a:pPr algn="ctr"/>
-            <a:r>
-              <a:rPr lang="en-US" b="1" dirty="0" smtClean="0"/>
-              <a:t>Diagonal Swap</a:t>
-            </a:r>
-            <a:endParaRPr lang="en-US" b="1" dirty="0"/>
-          </a:p>
-        </p:txBody>
-      </p:sp>
-      <p:sp>
-        <p:nvSpPr>
-          <p:cNvPr id="15" name="TextBox 14"/>
-          <p:cNvSpPr txBox="1"/>
-          <p:nvPr/>
-        </p:nvSpPr>
-        <p:spPr>
-          <a:xfrm>
-            <a:off x="4815964" y="5744900"/>
-            <a:ext cx="1784059" cy="369332"/>
-          </a:xfrm>
-          <a:prstGeom prst="rect">
-            <a:avLst/>
-          </a:prstGeom>
-          <a:noFill/>
-        </p:spPr>
-        <p:txBody>
-          <a:bodyPr wrap="square" rtlCol="0">
-            <a:spAutoFit/>
-          </a:bodyPr>
-          <a:lstStyle/>
-          <a:p>
-            <a:pPr algn="ctr"/>
-            <a:r>
-              <a:rPr lang="en-US" b="1" dirty="0" smtClean="0"/>
-              <a:t>Adjacent Swap</a:t>
-            </a:r>
-            <a:endParaRPr lang="en-US" b="1" dirty="0"/>
-          </a:p>
-        </p:txBody>
-      </p:sp>
-      <p:sp>
-        <p:nvSpPr>
-          <p:cNvPr id="16" name="TextBox 15"/>
-          <p:cNvSpPr txBox="1"/>
-          <p:nvPr/>
-        </p:nvSpPr>
-        <p:spPr>
-          <a:xfrm>
-            <a:off x="7721747" y="5752010"/>
+            <a:off x="6471681" y="5752010"/>
             <a:ext cx="819007" cy="369332"/>
           </a:xfrm>
           <a:prstGeom prst="rect">
@@ -12340,8 +12572,12 @@
               <a:t> </a:t>
             </a:r>
             <a:r>
+              <a:rPr lang="en-US" dirty="0"/>
+              <a:t>2</a:t>
+            </a:r>
+            <a:r>
               <a:rPr lang="en-US" dirty="0" smtClean="0"/>
-              <a:t>1 algorithm </a:t>
+              <a:t> algorithms </a:t>
             </a:r>
             <a:r>
               <a:rPr lang="mr-IN" dirty="0"/>
@@ -12405,7 +12641,275 @@
                   <a:srgbClr val="FFFF00"/>
                 </a:solidFill>
               </a:rPr>
+              <a:t>L </a:t>
+            </a:r>
+            <a:r>
+              <a:rPr lang="en-GB" dirty="0" smtClean="0"/>
+              <a:t>and </a:t>
+            </a:r>
+            <a:r>
+              <a:rPr lang="mr-IN" b="1" dirty="0">
+                <a:solidFill>
+                  <a:srgbClr val="FFFF00"/>
+                </a:solidFill>
+              </a:rPr>
+              <a:t>(</a:t>
+            </a:r>
+            <a:r>
+              <a:rPr lang="mr-IN" b="1" dirty="0" err="1" smtClean="0">
+                <a:solidFill>
+                  <a:srgbClr val="FFFF00"/>
+                </a:solidFill>
+              </a:rPr>
+              <a:t>R</a:t>
+            </a:r>
+            <a:r>
+              <a:rPr lang="en-GB" b="1" dirty="0" smtClean="0">
+                <a:solidFill>
+                  <a:srgbClr val="FFFF00"/>
+                </a:solidFill>
+              </a:rPr>
+              <a:t> </a:t>
+            </a:r>
+            <a:r>
+              <a:rPr lang="mr-IN" b="1" dirty="0" err="1" smtClean="0">
+                <a:solidFill>
+                  <a:srgbClr val="FFFF00"/>
+                </a:solidFill>
+              </a:rPr>
+              <a:t>U</a:t>
+            </a:r>
+            <a:r>
+              <a:rPr lang="mr-IN" b="1" dirty="0" smtClean="0">
+                <a:solidFill>
+                  <a:srgbClr val="FFFF00"/>
+                </a:solidFill>
+              </a:rPr>
+              <a:t>’</a:t>
+            </a:r>
+            <a:r>
+              <a:rPr lang="en-GB" b="1" dirty="0" smtClean="0">
+                <a:solidFill>
+                  <a:srgbClr val="FFFF00"/>
+                </a:solidFill>
+              </a:rPr>
+              <a:t> </a:t>
+            </a:r>
+            <a:r>
+              <a:rPr lang="mr-IN" b="1" dirty="0" smtClean="0">
+                <a:solidFill>
+                  <a:srgbClr val="FFFF00"/>
+                </a:solidFill>
+              </a:rPr>
               <a:t>L</a:t>
+            </a:r>
+            <a:r>
+              <a:rPr lang="en-GB" b="1" dirty="0" smtClean="0">
+                <a:solidFill>
+                  <a:srgbClr val="FFFF00"/>
+                </a:solidFill>
+              </a:rPr>
+              <a:t> </a:t>
+            </a:r>
+            <a:r>
+              <a:rPr lang="mr-IN" b="1" dirty="0" smtClean="0">
+                <a:solidFill>
+                  <a:srgbClr val="FFFF00"/>
+                </a:solidFill>
+              </a:rPr>
+              <a:t>U2’</a:t>
+            </a:r>
+            <a:r>
+              <a:rPr lang="en-GB" b="1" dirty="0" smtClean="0">
+                <a:solidFill>
+                  <a:srgbClr val="FFFF00"/>
+                </a:solidFill>
+              </a:rPr>
+              <a:t> </a:t>
+            </a:r>
+            <a:r>
+              <a:rPr lang="mr-IN" b="1" dirty="0" err="1" smtClean="0">
+                <a:solidFill>
+                  <a:srgbClr val="FFFF00"/>
+                </a:solidFill>
+              </a:rPr>
+              <a:t>R</a:t>
+            </a:r>
+            <a:r>
+              <a:rPr lang="mr-IN" b="1" dirty="0" smtClean="0">
+                <a:solidFill>
+                  <a:srgbClr val="FFFF00"/>
+                </a:solidFill>
+              </a:rPr>
+              <a:t>’</a:t>
+            </a:r>
+            <a:r>
+              <a:rPr lang="en-GB" b="1" dirty="0" smtClean="0">
+                <a:solidFill>
+                  <a:srgbClr val="FFFF00"/>
+                </a:solidFill>
+              </a:rPr>
+              <a:t> </a:t>
+            </a:r>
+            <a:r>
+              <a:rPr lang="mr-IN" b="1" dirty="0" err="1" smtClean="0">
+                <a:solidFill>
+                  <a:srgbClr val="FFFF00"/>
+                </a:solidFill>
+              </a:rPr>
+              <a:t>U</a:t>
+            </a:r>
+            <a:r>
+              <a:rPr lang="en-GB" b="1" dirty="0">
+                <a:solidFill>
+                  <a:srgbClr val="FFFF00"/>
+                </a:solidFill>
+              </a:rPr>
+              <a:t> </a:t>
+            </a:r>
+            <a:r>
+              <a:rPr lang="mr-IN" b="1" dirty="0" smtClean="0">
+                <a:solidFill>
+                  <a:srgbClr val="FFFF00"/>
+                </a:solidFill>
+              </a:rPr>
+              <a:t>L')</a:t>
+            </a:r>
+            <a:r>
+              <a:rPr lang="en-GB" b="1" dirty="0" smtClean="0">
+                <a:solidFill>
+                  <a:srgbClr val="FFFF00"/>
+                </a:solidFill>
+              </a:rPr>
+              <a:t> </a:t>
+            </a:r>
+            <a:r>
+              <a:rPr lang="mr-IN" b="1" dirty="0">
+                <a:solidFill>
+                  <a:srgbClr val="FFFF00"/>
+                </a:solidFill>
+              </a:rPr>
+              <a:t>(</a:t>
+            </a:r>
+            <a:r>
+              <a:rPr lang="mr-IN" b="1" dirty="0" err="1">
+                <a:solidFill>
+                  <a:srgbClr val="FFFF00"/>
+                </a:solidFill>
+              </a:rPr>
+              <a:t>R</a:t>
+            </a:r>
+            <a:r>
+              <a:rPr lang="en-GB" b="1" dirty="0">
+                <a:solidFill>
+                  <a:srgbClr val="FFFF00"/>
+                </a:solidFill>
+              </a:rPr>
+              <a:t> </a:t>
+            </a:r>
+            <a:r>
+              <a:rPr lang="mr-IN" b="1" dirty="0" err="1">
+                <a:solidFill>
+                  <a:srgbClr val="FFFF00"/>
+                </a:solidFill>
+              </a:rPr>
+              <a:t>U</a:t>
+            </a:r>
+            <a:r>
+              <a:rPr lang="mr-IN" b="1" dirty="0">
+                <a:solidFill>
+                  <a:srgbClr val="FFFF00"/>
+                </a:solidFill>
+              </a:rPr>
+              <a:t>’</a:t>
+            </a:r>
+            <a:r>
+              <a:rPr lang="en-GB" b="1" dirty="0">
+                <a:solidFill>
+                  <a:srgbClr val="FFFF00"/>
+                </a:solidFill>
+              </a:rPr>
+              <a:t> </a:t>
+            </a:r>
+            <a:r>
+              <a:rPr lang="mr-IN" b="1" dirty="0">
+                <a:solidFill>
+                  <a:srgbClr val="FFFF00"/>
+                </a:solidFill>
+              </a:rPr>
+              <a:t>L</a:t>
+            </a:r>
+            <a:r>
+              <a:rPr lang="en-GB" b="1" dirty="0">
+                <a:solidFill>
+                  <a:srgbClr val="FFFF00"/>
+                </a:solidFill>
+              </a:rPr>
+              <a:t> </a:t>
+            </a:r>
+            <a:r>
+              <a:rPr lang="mr-IN" b="1" dirty="0">
+                <a:solidFill>
+                  <a:srgbClr val="FFFF00"/>
+                </a:solidFill>
+              </a:rPr>
+              <a:t>U2’</a:t>
+            </a:r>
+            <a:r>
+              <a:rPr lang="en-GB" b="1" dirty="0">
+                <a:solidFill>
+                  <a:srgbClr val="FFFF00"/>
+                </a:solidFill>
+              </a:rPr>
+              <a:t> </a:t>
+            </a:r>
+            <a:r>
+              <a:rPr lang="mr-IN" b="1" dirty="0" err="1">
+                <a:solidFill>
+                  <a:srgbClr val="FFFF00"/>
+                </a:solidFill>
+              </a:rPr>
+              <a:t>R</a:t>
+            </a:r>
+            <a:r>
+              <a:rPr lang="mr-IN" b="1" dirty="0">
+                <a:solidFill>
+                  <a:srgbClr val="FFFF00"/>
+                </a:solidFill>
+              </a:rPr>
+              <a:t>’</a:t>
+            </a:r>
+            <a:r>
+              <a:rPr lang="en-GB" b="1" dirty="0">
+                <a:solidFill>
+                  <a:srgbClr val="FFFF00"/>
+                </a:solidFill>
+              </a:rPr>
+              <a:t> </a:t>
+            </a:r>
+            <a:r>
+              <a:rPr lang="mr-IN" b="1" dirty="0" err="1">
+                <a:solidFill>
+                  <a:srgbClr val="FFFF00"/>
+                </a:solidFill>
+              </a:rPr>
+              <a:t>U</a:t>
+            </a:r>
+            <a:r>
+              <a:rPr lang="en-GB" b="1" dirty="0">
+                <a:solidFill>
+                  <a:srgbClr val="FFFF00"/>
+                </a:solidFill>
+              </a:rPr>
+              <a:t> </a:t>
+            </a:r>
+            <a:r>
+              <a:rPr lang="mr-IN" b="1" dirty="0">
+                <a:solidFill>
+                  <a:srgbClr val="FFFF00"/>
+                </a:solidFill>
+              </a:rPr>
+              <a:t>L')</a:t>
             </a:r>
             <a:endParaRPr lang="en-US" b="1" dirty="0">
               <a:solidFill>
@@ -12460,7 +12964,7 @@
             </a:r>
             <a:r>
               <a:rPr lang="en-GB" b="1" dirty="0" smtClean="0"/>
-              <a:t>23</a:t>
+              <a:t>14</a:t>
             </a:r>
             <a:r>
               <a:rPr lang="en-GB" dirty="0" smtClean="0"/>
@@ -12471,36 +12975,36 @@
               <a:t>moves, </a:t>
             </a:r>
             <a:r>
+              <a:rPr lang="en-GB" b="1" dirty="0"/>
+              <a:t>1</a:t>
+            </a:r>
+            <a:r>
+              <a:rPr lang="en-GB" dirty="0" smtClean="0"/>
+              <a:t> look</a:t>
+            </a:r>
+            <a:endParaRPr lang="en-GB" dirty="0"/>
+          </a:p>
+          <a:p>
+            <a:pPr lvl="1"/>
+            <a:r>
+              <a:rPr lang="en-GB" b="1" dirty="0" smtClean="0">
+                <a:solidFill>
+                  <a:srgbClr val="FFFF00"/>
+                </a:solidFill>
+              </a:rPr>
+              <a:t>“</a:t>
+            </a:r>
+            <a:r>
+              <a:rPr lang="en-GB" b="1" dirty="0">
+                <a:solidFill>
+                  <a:srgbClr val="FFFF00"/>
+                </a:solidFill>
+              </a:rPr>
+              <a:t>Weighted Average”		</a:t>
+            </a:r>
+            <a:r>
               <a:rPr lang="en-GB" b="1" dirty="0" smtClean="0"/>
-              <a:t>2</a:t>
-            </a:r>
-            <a:r>
-              <a:rPr lang="en-GB" dirty="0" smtClean="0"/>
-              <a:t> looks</a:t>
-            </a:r>
-            <a:endParaRPr lang="en-GB" dirty="0"/>
-          </a:p>
-          <a:p>
-            <a:pPr lvl="1"/>
-            <a:r>
-              <a:rPr lang="en-GB" b="1" dirty="0" smtClean="0">
-                <a:solidFill>
-                  <a:srgbClr val="FFFF00"/>
-                </a:solidFill>
-              </a:rPr>
-              <a:t>“</a:t>
-            </a:r>
-            <a:r>
-              <a:rPr lang="en-GB" b="1" dirty="0">
-                <a:solidFill>
-                  <a:srgbClr val="FFFF00"/>
-                </a:solidFill>
-              </a:rPr>
-              <a:t>Weighted Average”		</a:t>
-            </a:r>
-            <a:r>
-              <a:rPr lang="en-GB" b="1" dirty="0" smtClean="0"/>
-              <a:t>11.2</a:t>
+              <a:t>9.7</a:t>
             </a:r>
             <a:r>
               <a:rPr lang="en-GB" dirty="0" smtClean="0"/>
@@ -12512,12 +13016,13 @@
             </a:r>
             <a:r>
               <a:rPr lang="en-GB" b="1" dirty="0" smtClean="0"/>
-              <a:t>1.2</a:t>
+              <a:t>1</a:t>
             </a:r>
             <a:r>
               <a:rPr lang="en-GB" dirty="0" smtClean="0"/>
-              <a:t> looks</a:t>
-            </a:r>
+              <a:t> look</a:t>
+            </a:r>
+            <a:endParaRPr lang="en-GB" dirty="0" smtClean="0"/>
           </a:p>
           <a:p>
             <a:pPr lvl="1"/>
@@ -12619,7 +13124,7 @@
         </p:blipFill>
         <p:spPr>
           <a:xfrm>
-            <a:off x="9204333" y="3780095"/>
+            <a:off x="10176607" y="3780095"/>
             <a:ext cx="1219200" cy="1219200"/>
           </a:xfrm>
           <a:prstGeom prst="rect">
@@ -12697,7 +13202,7 @@
         </p:nvSpPr>
         <p:spPr>
           <a:xfrm>
-            <a:off x="9456185" y="4938808"/>
+            <a:off x="10414117" y="4999295"/>
             <a:ext cx="735842" cy="338554"/>
           </a:xfrm>
           <a:prstGeom prst="rect">

</xml_diff>